<commit_message>
case 2, lesson 3 updates
</commit_message>
<xml_diff>
--- a/Case 2 - COVID/Lesson 3/Slides/Lesson 3 Slides.pptx
+++ b/Case 2 - COVID/Lesson 3/Slides/Lesson 3 Slides.pptx
@@ -1,6 +1,6 @@
 
 <file path=ppt/presentation.xml><?xml version="1.0" encoding="utf-8"?>
-<p:presentation xmlns:a="http://schemas.openxmlformats.org/drawingml/2006/main" xmlns:r="http://schemas.openxmlformats.org/officeDocument/2006/relationships" xmlns:mc="http://schemas.openxmlformats.org/markup-compatibility/2006" xmlns:mv="urn:schemas-microsoft-com:mac:vml" xmlns:p="http://schemas.openxmlformats.org/presentationml/2006/main" xmlns:c="http://schemas.openxmlformats.org/drawingml/2006/chart" xmlns:dgm="http://schemas.openxmlformats.org/drawingml/2006/diagram" xmlns:o="urn:schemas-microsoft-com:office:office" xmlns:v="urn:schemas-microsoft-com:vml" xmlns:pvml="urn:schemas-microsoft-com:office:powerpoint" xmlns:com="http://schemas.openxmlformats.org/drawingml/2006/compatibility" xmlns:p14="http://schemas.microsoft.com/office/powerpoint/2010/main" xmlns:p15="http://schemas.microsoft.com/office/powerpoint/2012/main" xmlns:ahyp="http://schemas.microsoft.com/office/drawing/2018/hyperlinkcolor" autoCompressPictures="0" strictFirstAndLastChars="0" saveSubsetFonts="1">
+<p:presentation xmlns:a="http://schemas.openxmlformats.org/drawingml/2006/main" xmlns:r="http://schemas.openxmlformats.org/officeDocument/2006/relationships" xmlns:mc="http://schemas.openxmlformats.org/markup-compatibility/2006" xmlns:mv="urn:schemas-microsoft-com:mac:vml" xmlns:p="http://schemas.openxmlformats.org/presentationml/2006/main" xmlns:c="http://schemas.openxmlformats.org/drawingml/2006/chart" xmlns:dgm="http://schemas.openxmlformats.org/drawingml/2006/diagram" xmlns:o="urn:schemas-microsoft-com:office:office" xmlns:v="urn:schemas-microsoft-com:vml" xmlns:pvml="urn:schemas-microsoft-com:office:powerpoint" xmlns:com="http://schemas.openxmlformats.org/drawingml/2006/compatibility" xmlns:p14="http://schemas.microsoft.com/office/powerpoint/2010/main" xmlns:p15="http://schemas.microsoft.com/office/powerpoint/2012/main" xmlns:ahyp="http://schemas.microsoft.com/office/drawing/2018/hyperlinkcolor" autoCompressPictures="0" embedTrueTypeFonts="1" strictFirstAndLastChars="0" saveSubsetFonts="1">
   <p:sldMasterIdLst>
     <p:sldMasterId id="2147483659" r:id="rId4"/>
   </p:sldMasterIdLst>
@@ -16,9 +16,23 @@
     <p:sldId id="261" r:id="rId11"/>
     <p:sldId id="262" r:id="rId12"/>
     <p:sldId id="263" r:id="rId13"/>
+    <p:sldId id="264" r:id="rId14"/>
   </p:sldIdLst>
   <p:sldSz cy="5143500" cx="9144000"/>
   <p:notesSz cx="6858000" cy="9144000"/>
+  <p:embeddedFontLst>
+    <p:embeddedFont>
+      <p:font typeface="Fjalla One"/>
+      <p:regular r:id="rId15"/>
+    </p:embeddedFont>
+    <p:embeddedFont>
+      <p:font typeface="Red Hat Display"/>
+      <p:regular r:id="rId16"/>
+      <p:bold r:id="rId17"/>
+      <p:italic r:id="rId18"/>
+      <p:boldItalic r:id="rId19"/>
+    </p:embeddedFont>
+  </p:embeddedFontLst>
   <p:defaultTextStyle>
     <a:defPPr lvl="0" marR="0" rtl="0" algn="l">
       <a:lnSpc>
@@ -1359,7 +1373,7 @@
                   <a:schemeClr val="dk1"/>
                 </a:solidFill>
               </a:rPr>
-              <a:t>However, proxy variables can also be used when data for the variables “under their umbrella”. However, data scientists need to be very careful when using proxies and clear in why and how they are using them.</a:t>
+              <a:t>However, proxy variables can also be used when data for the variables are “under their umbrella”. However, data scientists need to be very careful when using proxies and clear in why and how they are using them.</a:t>
             </a:r>
             <a:endParaRPr sz="1300">
               <a:solidFill>
@@ -1481,7 +1495,7 @@
   <p:cSld>
     <p:spTree>
       <p:nvGrpSpPr>
-        <p:cNvPr id="100" name="Shape 100"/>
+        <p:cNvPr id="99" name="Shape 99"/>
         <p:cNvGrpSpPr/>
         <p:nvPr/>
       </p:nvGrpSpPr>
@@ -1495,7 +1509,7 @@
       </p:grpSpPr>
       <p:sp>
         <p:nvSpPr>
-          <p:cNvPr id="101" name="Google Shape;101;g23f8e6efd4e_0_20:notes"/>
+          <p:cNvPr id="100" name="Google Shape;100;g23f8e6efd4e_0_20:notes"/>
           <p:cNvSpPr/>
           <p:nvPr>
             <p:ph idx="2" type="sldImg"/>
@@ -1530,7 +1544,7 @@
       </p:sp>
       <p:sp>
         <p:nvSpPr>
-          <p:cNvPr id="102" name="Google Shape;102;g23f8e6efd4e_0_20:notes"/>
+          <p:cNvPr id="101" name="Google Shape;101;g23f8e6efd4e_0_20:notes"/>
           <p:cNvSpPr txBox="1"/>
           <p:nvPr>
             <p:ph idx="1" type="body"/>
@@ -1580,7 +1594,7 @@
   <p:cSld>
     <p:spTree>
       <p:nvGrpSpPr>
-        <p:cNvPr id="112" name="Shape 112"/>
+        <p:cNvPr id="110" name="Shape 110"/>
         <p:cNvGrpSpPr/>
         <p:nvPr/>
       </p:nvGrpSpPr>
@@ -1594,7 +1608,7 @@
       </p:grpSpPr>
       <p:sp>
         <p:nvSpPr>
-          <p:cNvPr id="113" name="Google Shape;113;g23f8e6efd4e_0_31:notes"/>
+          <p:cNvPr id="111" name="Google Shape;111;g2fcf3acaeff_0_1:notes"/>
           <p:cNvSpPr/>
           <p:nvPr>
             <p:ph idx="2" type="sldImg"/>
@@ -1629,7 +1643,106 @@
       </p:sp>
       <p:sp>
         <p:nvSpPr>
-          <p:cNvPr id="114" name="Google Shape;114;g23f8e6efd4e_0_31:notes"/>
+          <p:cNvPr id="112" name="Google Shape;112;g2fcf3acaeff_0_1:notes"/>
+          <p:cNvSpPr txBox="1"/>
+          <p:nvPr>
+            <p:ph idx="1" type="body"/>
+          </p:nvPr>
+        </p:nvSpPr>
+        <p:spPr>
+          <a:xfrm>
+            <a:off x="685800" y="4343400"/>
+            <a:ext cx="5486400" cy="4114800"/>
+          </a:xfrm>
+          <a:prstGeom prst="rect">
+            <a:avLst/>
+          </a:prstGeom>
+        </p:spPr>
+        <p:txBody>
+          <a:bodyPr anchorCtr="0" anchor="t" bIns="91425" lIns="91425" spcFirstLastPara="1" rIns="91425" wrap="square" tIns="91425">
+            <a:noAutofit/>
+          </a:bodyPr>
+          <a:lstStyle/>
+          <a:p>
+            <a:pPr indent="0" lvl="0" marL="0" rtl="0" algn="l">
+              <a:spcBef>
+                <a:spcPts val="0"/>
+              </a:spcBef>
+              <a:spcAft>
+                <a:spcPts val="0"/>
+              </a:spcAft>
+              <a:buNone/>
+            </a:pPr>
+            <a:r>
+              <a:t/>
+            </a:r>
+            <a:endParaRPr/>
+          </a:p>
+        </p:txBody>
+      </p:sp>
+    </p:spTree>
+  </p:cSld>
+  <p:clrMapOvr>
+    <a:masterClrMapping/>
+  </p:clrMapOvr>
+</p:notes>
+</file>
+
+<file path=ppt/notesSlides/notesSlide9.xml><?xml version="1.0" encoding="utf-8"?>
+<p:notes xmlns:a="http://schemas.openxmlformats.org/drawingml/2006/main" xmlns:r="http://schemas.openxmlformats.org/officeDocument/2006/relationships" xmlns:mc="http://schemas.openxmlformats.org/markup-compatibility/2006" xmlns:mv="urn:schemas-microsoft-com:mac:vml" xmlns:p="http://schemas.openxmlformats.org/presentationml/2006/main" xmlns:c="http://schemas.openxmlformats.org/drawingml/2006/chart" xmlns:dgm="http://schemas.openxmlformats.org/drawingml/2006/diagram" xmlns:o="urn:schemas-microsoft-com:office:office" xmlns:v="urn:schemas-microsoft-com:vml" xmlns:pvml="urn:schemas-microsoft-com:office:powerpoint" xmlns:com="http://schemas.openxmlformats.org/drawingml/2006/compatibility" xmlns:p14="http://schemas.microsoft.com/office/powerpoint/2010/main" xmlns:p15="http://schemas.microsoft.com/office/powerpoint/2012/main" xmlns:ahyp="http://schemas.microsoft.com/office/drawing/2018/hyperlinkcolor" showMasterPhAnim="0" showMasterSp="0">
+  <p:cSld>
+    <p:spTree>
+      <p:nvGrpSpPr>
+        <p:cNvPr id="125" name="Shape 125"/>
+        <p:cNvGrpSpPr/>
+        <p:nvPr/>
+      </p:nvGrpSpPr>
+      <p:grpSpPr>
+        <a:xfrm>
+          <a:off x="0" y="0"/>
+          <a:ext cx="0" cy="0"/>
+          <a:chOff x="0" y="0"/>
+          <a:chExt cx="0" cy="0"/>
+        </a:xfrm>
+      </p:grpSpPr>
+      <p:sp>
+        <p:nvSpPr>
+          <p:cNvPr id="126" name="Google Shape;126;g23f8e6efd4e_0_31:notes"/>
+          <p:cNvSpPr/>
+          <p:nvPr>
+            <p:ph idx="2" type="sldImg"/>
+          </p:nvPr>
+        </p:nvSpPr>
+        <p:spPr>
+          <a:xfrm>
+            <a:off x="381300" y="685800"/>
+            <a:ext cx="6096000" cy="3429000"/>
+          </a:xfrm>
+          <a:custGeom>
+            <a:rect b="b" l="l" r="r" t="t"/>
+            <a:pathLst>
+              <a:path extrusionOk="0" h="120000" w="120000">
+                <a:moveTo>
+                  <a:pt x="0" y="0"/>
+                </a:moveTo>
+                <a:lnTo>
+                  <a:pt x="120000" y="0"/>
+                </a:lnTo>
+                <a:lnTo>
+                  <a:pt x="120000" y="120000"/>
+                </a:lnTo>
+                <a:lnTo>
+                  <a:pt x="0" y="120000"/>
+                </a:lnTo>
+                <a:close/>
+              </a:path>
+            </a:pathLst>
+          </a:custGeom>
+        </p:spPr>
+      </p:sp>
+      <p:sp>
+        <p:nvSpPr>
+          <p:cNvPr id="127" name="Google Shape;127;g23f8e6efd4e_0_31:notes"/>
           <p:cNvSpPr txBox="1"/>
           <p:nvPr>
             <p:ph idx="1" type="body"/>
@@ -7308,88 +7421,9 @@
           <a:chExt cx="0" cy="0"/>
         </a:xfrm>
       </p:grpSpPr>
-      <p:sp>
-        <p:nvSpPr>
-          <p:cNvPr id="96" name="Google Shape;96;p18"/>
-          <p:cNvSpPr txBox="1"/>
-          <p:nvPr>
-            <p:ph type="title"/>
-          </p:nvPr>
-        </p:nvSpPr>
-        <p:spPr>
-          <a:xfrm>
-            <a:off x="311700" y="445025"/>
-            <a:ext cx="8520600" cy="572700"/>
-          </a:xfrm>
-          <a:prstGeom prst="rect">
-            <a:avLst/>
-          </a:prstGeom>
-        </p:spPr>
-        <p:txBody>
-          <a:bodyPr anchorCtr="0" anchor="t" bIns="91425" lIns="91425" spcFirstLastPara="1" rIns="91425" wrap="square" tIns="91425">
-            <a:normAutofit fontScale="90000"/>
-          </a:bodyPr>
-          <a:lstStyle/>
-          <a:p>
-            <a:pPr indent="0" lvl="0" marL="0" rtl="0" algn="l">
-              <a:spcBef>
-                <a:spcPts val="0"/>
-              </a:spcBef>
-              <a:spcAft>
-                <a:spcPts val="0"/>
-              </a:spcAft>
-              <a:buNone/>
-            </a:pPr>
-            <a:r>
-              <a:rPr lang="en"/>
-              <a:t>Which are the proxy variables?</a:t>
-            </a:r>
-            <a:endParaRPr/>
-          </a:p>
-        </p:txBody>
-      </p:sp>
-      <p:sp>
-        <p:nvSpPr>
-          <p:cNvPr id="97" name="Google Shape;97;p18"/>
-          <p:cNvSpPr txBox="1"/>
-          <p:nvPr>
-            <p:ph idx="1" type="body"/>
-          </p:nvPr>
-        </p:nvSpPr>
-        <p:spPr>
-          <a:xfrm>
-            <a:off x="311700" y="1152475"/>
-            <a:ext cx="8520600" cy="3416400"/>
-          </a:xfrm>
-          <a:prstGeom prst="rect">
-            <a:avLst/>
-          </a:prstGeom>
-        </p:spPr>
-        <p:txBody>
-          <a:bodyPr anchorCtr="0" anchor="t" bIns="91425" lIns="91425" spcFirstLastPara="1" rIns="91425" wrap="square" tIns="91425">
-            <a:normAutofit/>
-          </a:bodyPr>
-          <a:lstStyle/>
-          <a:p>
-            <a:pPr indent="0" lvl="0" marL="0" rtl="0" algn="l">
-              <a:spcBef>
-                <a:spcPts val="0"/>
-              </a:spcBef>
-              <a:spcAft>
-                <a:spcPts val="1200"/>
-              </a:spcAft>
-              <a:buNone/>
-            </a:pPr>
-            <a:r>
-              <a:t/>
-            </a:r>
-            <a:endParaRPr/>
-          </a:p>
-        </p:txBody>
-      </p:sp>
       <p:pic>
         <p:nvPicPr>
-          <p:cNvPr id="98" name="Google Shape;98;p18"/>
+          <p:cNvPr id="96" name="Google Shape;96;p18"/>
           <p:cNvPicPr preferRelativeResize="0"/>
           <p:nvPr/>
         </p:nvPicPr>
@@ -7417,7 +7451,7 @@
       </p:pic>
       <p:pic>
         <p:nvPicPr>
-          <p:cNvPr id="99" name="Google Shape;99;p18"/>
+          <p:cNvPr id="97" name="Google Shape;97;p18"/>
           <p:cNvPicPr preferRelativeResize="0"/>
           <p:nvPr/>
         </p:nvPicPr>
@@ -7443,6 +7477,59 @@
           </a:ln>
         </p:spPr>
       </p:pic>
+      <p:sp>
+        <p:nvSpPr>
+          <p:cNvPr id="98" name="Google Shape;98;p18"/>
+          <p:cNvSpPr txBox="1"/>
+          <p:nvPr>
+            <p:ph type="title"/>
+          </p:nvPr>
+        </p:nvSpPr>
+        <p:spPr>
+          <a:xfrm>
+            <a:off x="311700" y="100151"/>
+            <a:ext cx="8520600" cy="899100"/>
+          </a:xfrm>
+          <a:prstGeom prst="rect">
+            <a:avLst/>
+          </a:prstGeom>
+        </p:spPr>
+        <p:txBody>
+          <a:bodyPr anchorCtr="0" anchor="t" bIns="91425" lIns="91425" spcFirstLastPara="1" rIns="91425" wrap="square" tIns="91425">
+            <a:noAutofit/>
+          </a:bodyPr>
+          <a:lstStyle/>
+          <a:p>
+            <a:pPr indent="0" lvl="0" marL="0" rtl="0" algn="l">
+              <a:spcBef>
+                <a:spcPts val="0"/>
+              </a:spcBef>
+              <a:spcAft>
+                <a:spcPts val="0"/>
+              </a:spcAft>
+              <a:buSzPts val="990"/>
+              <a:buNone/>
+            </a:pPr>
+            <a:r>
+              <a:rPr lang="en" sz="2120"/>
+              <a:t>Which are the variables that stand in </a:t>
+            </a:r>
+            <a:r>
+              <a:rPr lang="en" sz="2120">
+                <a:solidFill>
+                  <a:srgbClr val="FF0000"/>
+                </a:solidFill>
+              </a:rPr>
+              <a:t>as proxies</a:t>
+            </a:r>
+            <a:r>
+              <a:rPr lang="en" sz="2120"/>
+              <a:t> for a mechanism to get Covid – and which are more directly related to a mechanism?</a:t>
+            </a:r>
+            <a:endParaRPr sz="2120"/>
+          </a:p>
+        </p:txBody>
+      </p:sp>
     </p:spTree>
   </p:cSld>
   <p:clrMapOvr>
@@ -7456,7 +7543,7 @@
   <p:cSld>
     <p:spTree>
       <p:nvGrpSpPr>
-        <p:cNvPr id="103" name="Shape 103"/>
+        <p:cNvPr id="102" name="Shape 102"/>
         <p:cNvGrpSpPr/>
         <p:nvPr/>
       </p:nvGrpSpPr>
@@ -7470,7 +7557,7 @@
       </p:grpSpPr>
       <p:sp>
         <p:nvSpPr>
-          <p:cNvPr id="104" name="Google Shape;104;p19"/>
+          <p:cNvPr id="103" name="Google Shape;103;p19"/>
           <p:cNvSpPr txBox="1"/>
           <p:nvPr>
             <p:ph type="title"/>
@@ -7478,8 +7565,8 @@
         </p:nvSpPr>
         <p:spPr>
           <a:xfrm>
-            <a:off x="311700" y="445025"/>
-            <a:ext cx="8520600" cy="572700"/>
+            <a:off x="311700" y="100151"/>
+            <a:ext cx="8520600" cy="899100"/>
           </a:xfrm>
           <a:prstGeom prst="rect">
             <a:avLst/>
@@ -7487,7 +7574,7 @@
         </p:spPr>
         <p:txBody>
           <a:bodyPr anchorCtr="0" anchor="t" bIns="91425" lIns="91425" spcFirstLastPara="1" rIns="91425" wrap="square" tIns="91425">
-            <a:normAutofit fontScale="90000"/>
+            <a:noAutofit/>
           </a:bodyPr>
           <a:lstStyle/>
           <a:p>
@@ -7498,58 +7585,32 @@
               <a:spcAft>
                 <a:spcPts val="0"/>
               </a:spcAft>
+              <a:buSzPts val="990"/>
               <a:buNone/>
             </a:pPr>
             <a:r>
-              <a:rPr lang="en"/>
-              <a:t>Which are the proxy variables?</a:t>
+              <a:rPr lang="en" sz="2120"/>
+              <a:t>Which are the variables that stand in </a:t>
             </a:r>
-            <a:endParaRPr/>
-          </a:p>
-        </p:txBody>
-      </p:sp>
-      <p:sp>
-        <p:nvSpPr>
-          <p:cNvPr id="105" name="Google Shape;105;p19"/>
-          <p:cNvSpPr txBox="1"/>
-          <p:nvPr>
-            <p:ph idx="1" type="body"/>
-          </p:nvPr>
-        </p:nvSpPr>
-        <p:spPr>
-          <a:xfrm>
-            <a:off x="311700" y="1152475"/>
-            <a:ext cx="8520600" cy="3416400"/>
-          </a:xfrm>
-          <a:prstGeom prst="rect">
-            <a:avLst/>
-          </a:prstGeom>
-        </p:spPr>
-        <p:txBody>
-          <a:bodyPr anchorCtr="0" anchor="t" bIns="91425" lIns="91425" spcFirstLastPara="1" rIns="91425" wrap="square" tIns="91425">
-            <a:normAutofit/>
-          </a:bodyPr>
-          <a:lstStyle/>
-          <a:p>
-            <a:pPr indent="0" lvl="0" marL="0" rtl="0" algn="l">
-              <a:spcBef>
-                <a:spcPts val="0"/>
-              </a:spcBef>
-              <a:spcAft>
-                <a:spcPts val="1200"/>
-              </a:spcAft>
-              <a:buNone/>
-            </a:pPr>
             <a:r>
-              <a:t/>
+              <a:rPr lang="en" sz="2120">
+                <a:solidFill>
+                  <a:srgbClr val="FF0000"/>
+                </a:solidFill>
+              </a:rPr>
+              <a:t>as proxies</a:t>
             </a:r>
-            <a:endParaRPr/>
+            <a:r>
+              <a:rPr lang="en" sz="2120"/>
+              <a:t> for a mechanism to get Covid – and which are more directly related to a mechanism?</a:t>
+            </a:r>
+            <a:endParaRPr sz="2120"/>
           </a:p>
         </p:txBody>
       </p:sp>
       <p:pic>
         <p:nvPicPr>
-          <p:cNvPr id="106" name="Google Shape;106;p19"/>
+          <p:cNvPr id="104" name="Google Shape;104;p19"/>
           <p:cNvPicPr preferRelativeResize="0"/>
           <p:nvPr/>
         </p:nvPicPr>
@@ -7577,14 +7638,14 @@
       </p:pic>
       <p:sp>
         <p:nvSpPr>
-          <p:cNvPr id="107" name="Google Shape;107;p19"/>
+          <p:cNvPr id="105" name="Google Shape;105;p19"/>
           <p:cNvSpPr/>
           <p:nvPr/>
         </p:nvSpPr>
         <p:spPr>
           <a:xfrm>
-            <a:off x="365950" y="1531525"/>
-            <a:ext cx="2310900" cy="840300"/>
+            <a:off x="365950" y="1276275"/>
+            <a:ext cx="2310900" cy="844500"/>
           </a:xfrm>
           <a:prstGeom prst="roundRect">
             <a:avLst>
@@ -7626,14 +7687,14 @@
       </p:sp>
       <p:sp>
         <p:nvSpPr>
-          <p:cNvPr id="108" name="Google Shape;108;p19"/>
+          <p:cNvPr id="106" name="Google Shape;106;p19"/>
           <p:cNvSpPr/>
           <p:nvPr/>
         </p:nvSpPr>
         <p:spPr>
           <a:xfrm>
             <a:off x="365950" y="2885625"/>
-            <a:ext cx="2283600" cy="621300"/>
+            <a:ext cx="2283600" cy="267600"/>
           </a:xfrm>
           <a:prstGeom prst="roundRect">
             <a:avLst>
@@ -7675,7 +7736,7 @@
       </p:sp>
       <p:sp>
         <p:nvSpPr>
-          <p:cNvPr id="109" name="Google Shape;109;p19"/>
+          <p:cNvPr id="107" name="Google Shape;107;p19"/>
           <p:cNvSpPr/>
           <p:nvPr/>
         </p:nvSpPr>
@@ -7724,7 +7785,7 @@
       </p:sp>
       <p:pic>
         <p:nvPicPr>
-          <p:cNvPr id="110" name="Google Shape;110;p19"/>
+          <p:cNvPr id="108" name="Google Shape;108;p19"/>
           <p:cNvPicPr preferRelativeResize="0"/>
           <p:nvPr/>
         </p:nvPicPr>
@@ -7752,7 +7813,7 @@
       </p:pic>
       <p:sp>
         <p:nvSpPr>
-          <p:cNvPr id="111" name="Google Shape;111;p19"/>
+          <p:cNvPr id="109" name="Google Shape;109;p19"/>
           <p:cNvSpPr/>
           <p:nvPr/>
         </p:nvSpPr>
@@ -7812,7 +7873,507 @@
   <p:cSld>
     <p:spTree>
       <p:nvGrpSpPr>
-        <p:cNvPr id="115" name="Shape 115"/>
+        <p:cNvPr id="113" name="Shape 113"/>
+        <p:cNvGrpSpPr/>
+        <p:nvPr/>
+      </p:nvGrpSpPr>
+      <p:grpSpPr>
+        <a:xfrm>
+          <a:off x="0" y="0"/>
+          <a:ext cx="0" cy="0"/>
+          <a:chOff x="0" y="0"/>
+          <a:chExt cx="0" cy="0"/>
+        </a:xfrm>
+      </p:grpSpPr>
+      <p:pic>
+        <p:nvPicPr>
+          <p:cNvPr id="114" name="Google Shape;114;p20"/>
+          <p:cNvPicPr preferRelativeResize="0"/>
+          <p:nvPr/>
+        </p:nvPicPr>
+        <p:blipFill>
+          <a:blip r:embed="rId3">
+            <a:alphaModFix/>
+          </a:blip>
+          <a:stretch>
+            <a:fillRect/>
+          </a:stretch>
+        </p:blipFill>
+        <p:spPr>
+          <a:xfrm>
+            <a:off x="3128975" y="1949872"/>
+            <a:ext cx="2869575" cy="2252417"/>
+          </a:xfrm>
+          <a:prstGeom prst="rect">
+            <a:avLst/>
+          </a:prstGeom>
+          <a:noFill/>
+          <a:ln>
+            <a:noFill/>
+          </a:ln>
+        </p:spPr>
+      </p:pic>
+      <p:sp>
+        <p:nvSpPr>
+          <p:cNvPr id="115" name="Google Shape;115;p20"/>
+          <p:cNvSpPr txBox="1"/>
+          <p:nvPr/>
+        </p:nvSpPr>
+        <p:spPr>
+          <a:xfrm>
+            <a:off x="3537525" y="1180600"/>
+            <a:ext cx="2677200" cy="498900"/>
+          </a:xfrm>
+          <a:prstGeom prst="rect">
+            <a:avLst/>
+          </a:prstGeom>
+          <a:noFill/>
+          <a:ln>
+            <a:noFill/>
+          </a:ln>
+        </p:spPr>
+        <p:txBody>
+          <a:bodyPr anchorCtr="0" anchor="t" bIns="91425" lIns="91425" spcFirstLastPara="1" rIns="91425" wrap="square" tIns="91425">
+            <a:noAutofit/>
+          </a:bodyPr>
+          <a:lstStyle/>
+          <a:p>
+            <a:pPr indent="0" lvl="0" marL="0" rtl="0" algn="l">
+              <a:spcBef>
+                <a:spcPts val="0"/>
+              </a:spcBef>
+              <a:spcAft>
+                <a:spcPts val="0"/>
+              </a:spcAft>
+              <a:buNone/>
+            </a:pPr>
+            <a:r>
+              <a:rPr b="1" lang="en" sz="1800">
+                <a:solidFill>
+                  <a:schemeClr val="dk2"/>
+                </a:solidFill>
+                <a:latin typeface="Red Hat Display"/>
+                <a:ea typeface="Red Hat Display"/>
+                <a:cs typeface="Red Hat Display"/>
+                <a:sym typeface="Red Hat Display"/>
+              </a:rPr>
+              <a:t>Risk factors at the individual level</a:t>
+            </a:r>
+            <a:endParaRPr b="1" sz="1800">
+              <a:solidFill>
+                <a:schemeClr val="dk2"/>
+              </a:solidFill>
+              <a:latin typeface="Red Hat Display"/>
+              <a:ea typeface="Red Hat Display"/>
+              <a:cs typeface="Red Hat Display"/>
+              <a:sym typeface="Red Hat Display"/>
+            </a:endParaRPr>
+          </a:p>
+        </p:txBody>
+      </p:sp>
+      <p:sp>
+        <p:nvSpPr>
+          <p:cNvPr id="116" name="Google Shape;116;p20"/>
+          <p:cNvSpPr txBox="1"/>
+          <p:nvPr/>
+        </p:nvSpPr>
+        <p:spPr>
+          <a:xfrm>
+            <a:off x="3296025" y="4275375"/>
+            <a:ext cx="2524800" cy="230400"/>
+          </a:xfrm>
+          <a:prstGeom prst="rect">
+            <a:avLst/>
+          </a:prstGeom>
+          <a:noFill/>
+          <a:ln>
+            <a:noFill/>
+          </a:ln>
+        </p:spPr>
+        <p:txBody>
+          <a:bodyPr anchorCtr="0" anchor="t" bIns="91425" lIns="91425" spcFirstLastPara="1" rIns="91425" wrap="square" tIns="91425">
+            <a:noAutofit/>
+          </a:bodyPr>
+          <a:lstStyle/>
+          <a:p>
+            <a:pPr indent="0" lvl="0" marL="0" rtl="0" algn="l">
+              <a:spcBef>
+                <a:spcPts val="0"/>
+              </a:spcBef>
+              <a:spcAft>
+                <a:spcPts val="0"/>
+              </a:spcAft>
+              <a:buNone/>
+            </a:pPr>
+            <a:r>
+              <a:rPr lang="en" sz="800">
+                <a:solidFill>
+                  <a:srgbClr val="B7B7B7"/>
+                </a:solidFill>
+              </a:rPr>
+              <a:t>https://virologyj.biomedcentral.com/articles/10.1186/s12985-023-02061-8</a:t>
+            </a:r>
+            <a:endParaRPr sz="800">
+              <a:solidFill>
+                <a:srgbClr val="B7B7B7"/>
+              </a:solidFill>
+            </a:endParaRPr>
+          </a:p>
+        </p:txBody>
+      </p:sp>
+      <p:sp>
+        <p:nvSpPr>
+          <p:cNvPr id="117" name="Google Shape;117;p20"/>
+          <p:cNvSpPr txBox="1"/>
+          <p:nvPr/>
+        </p:nvSpPr>
+        <p:spPr>
+          <a:xfrm>
+            <a:off x="6392125" y="1180600"/>
+            <a:ext cx="2734800" cy="297300"/>
+          </a:xfrm>
+          <a:prstGeom prst="rect">
+            <a:avLst/>
+          </a:prstGeom>
+          <a:noFill/>
+          <a:ln>
+            <a:noFill/>
+          </a:ln>
+        </p:spPr>
+        <p:txBody>
+          <a:bodyPr anchorCtr="0" anchor="t" bIns="91425" lIns="91425" spcFirstLastPara="1" rIns="91425" wrap="square" tIns="91425">
+            <a:noAutofit/>
+          </a:bodyPr>
+          <a:lstStyle/>
+          <a:p>
+            <a:pPr indent="0" lvl="0" marL="0" rtl="0" algn="l">
+              <a:spcBef>
+                <a:spcPts val="0"/>
+              </a:spcBef>
+              <a:spcAft>
+                <a:spcPts val="0"/>
+              </a:spcAft>
+              <a:buNone/>
+            </a:pPr>
+            <a:r>
+              <a:rPr b="1" lang="en" sz="1800">
+                <a:solidFill>
+                  <a:schemeClr val="dk2"/>
+                </a:solidFill>
+                <a:latin typeface="Red Hat Display"/>
+                <a:ea typeface="Red Hat Display"/>
+                <a:cs typeface="Red Hat Display"/>
+                <a:sym typeface="Red Hat Display"/>
+              </a:rPr>
+              <a:t>Mechanisms at the microbiological scale</a:t>
+            </a:r>
+            <a:endParaRPr b="1" sz="1800">
+              <a:solidFill>
+                <a:schemeClr val="dk2"/>
+              </a:solidFill>
+              <a:latin typeface="Red Hat Display"/>
+              <a:ea typeface="Red Hat Display"/>
+              <a:cs typeface="Red Hat Display"/>
+              <a:sym typeface="Red Hat Display"/>
+            </a:endParaRPr>
+          </a:p>
+        </p:txBody>
+      </p:sp>
+      <p:sp>
+        <p:nvSpPr>
+          <p:cNvPr id="118" name="Google Shape;118;p20"/>
+          <p:cNvSpPr txBox="1"/>
+          <p:nvPr/>
+        </p:nvSpPr>
+        <p:spPr>
+          <a:xfrm>
+            <a:off x="166875" y="4275375"/>
+            <a:ext cx="2137200" cy="431100"/>
+          </a:xfrm>
+          <a:prstGeom prst="rect">
+            <a:avLst/>
+          </a:prstGeom>
+          <a:noFill/>
+          <a:ln>
+            <a:noFill/>
+          </a:ln>
+        </p:spPr>
+        <p:txBody>
+          <a:bodyPr anchorCtr="0" anchor="t" bIns="91425" lIns="91425" spcFirstLastPara="1" rIns="91425" wrap="square" tIns="91425">
+            <a:spAutoFit/>
+          </a:bodyPr>
+          <a:lstStyle/>
+          <a:p>
+            <a:pPr indent="0" lvl="0" marL="0" rtl="0" algn="l">
+              <a:spcBef>
+                <a:spcPts val="0"/>
+              </a:spcBef>
+              <a:spcAft>
+                <a:spcPts val="0"/>
+              </a:spcAft>
+              <a:buNone/>
+            </a:pPr>
+            <a:r>
+              <a:rPr lang="en" sz="800">
+                <a:solidFill>
+                  <a:srgbClr val="B7B7B7"/>
+                </a:solidFill>
+              </a:rPr>
+              <a:t>https://hitconsultant.net/2019/03/18/social-determinants-of-health-sdoh-collection/</a:t>
+            </a:r>
+            <a:endParaRPr sz="1200"/>
+          </a:p>
+        </p:txBody>
+      </p:sp>
+      <p:pic>
+        <p:nvPicPr>
+          <p:cNvPr id="119" name="Google Shape;119;p20"/>
+          <p:cNvPicPr preferRelativeResize="0"/>
+          <p:nvPr/>
+        </p:nvPicPr>
+        <p:blipFill>
+          <a:blip r:embed="rId4">
+            <a:alphaModFix/>
+          </a:blip>
+          <a:stretch>
+            <a:fillRect/>
+          </a:stretch>
+        </p:blipFill>
+        <p:spPr>
+          <a:xfrm>
+            <a:off x="16300" y="1979958"/>
+            <a:ext cx="2524751" cy="2151831"/>
+          </a:xfrm>
+          <a:prstGeom prst="rect">
+            <a:avLst/>
+          </a:prstGeom>
+          <a:noFill/>
+          <a:ln>
+            <a:noFill/>
+          </a:ln>
+        </p:spPr>
+      </p:pic>
+      <p:sp>
+        <p:nvSpPr>
+          <p:cNvPr id="120" name="Google Shape;120;p20"/>
+          <p:cNvSpPr txBox="1"/>
+          <p:nvPr/>
+        </p:nvSpPr>
+        <p:spPr>
+          <a:xfrm>
+            <a:off x="6392125" y="4275375"/>
+            <a:ext cx="3000000" cy="307800"/>
+          </a:xfrm>
+          <a:prstGeom prst="rect">
+            <a:avLst/>
+          </a:prstGeom>
+          <a:noFill/>
+          <a:ln>
+            <a:noFill/>
+          </a:ln>
+        </p:spPr>
+        <p:txBody>
+          <a:bodyPr anchorCtr="0" anchor="t" bIns="91425" lIns="91425" spcFirstLastPara="1" rIns="91425" wrap="square" tIns="91425">
+            <a:spAutoFit/>
+          </a:bodyPr>
+          <a:lstStyle/>
+          <a:p>
+            <a:pPr indent="0" lvl="0" marL="0" rtl="0" algn="l">
+              <a:spcBef>
+                <a:spcPts val="0"/>
+              </a:spcBef>
+              <a:spcAft>
+                <a:spcPts val="0"/>
+              </a:spcAft>
+              <a:buNone/>
+            </a:pPr>
+            <a:r>
+              <a:rPr lang="en" sz="800">
+                <a:solidFill>
+                  <a:srgbClr val="B7B7B7"/>
+                </a:solidFill>
+              </a:rPr>
+              <a:t>https://www.nature.com/articles/s41392-023-01510-8</a:t>
+            </a:r>
+            <a:endParaRPr sz="1200"/>
+          </a:p>
+        </p:txBody>
+      </p:sp>
+      <p:pic>
+        <p:nvPicPr>
+          <p:cNvPr id="121" name="Google Shape;121;p20"/>
+          <p:cNvPicPr preferRelativeResize="0"/>
+          <p:nvPr/>
+        </p:nvPicPr>
+        <p:blipFill rotWithShape="1">
+          <a:blip r:embed="rId5">
+            <a:alphaModFix/>
+          </a:blip>
+          <a:srcRect b="0" l="3670" r="0" t="0"/>
+          <a:stretch/>
+        </p:blipFill>
+        <p:spPr>
+          <a:xfrm>
+            <a:off x="6392125" y="2069950"/>
+            <a:ext cx="2524749" cy="2012250"/>
+          </a:xfrm>
+          <a:prstGeom prst="rect">
+            <a:avLst/>
+          </a:prstGeom>
+          <a:noFill/>
+          <a:ln>
+            <a:noFill/>
+          </a:ln>
+        </p:spPr>
+      </p:pic>
+      <p:sp>
+        <p:nvSpPr>
+          <p:cNvPr id="122" name="Google Shape;122;p20"/>
+          <p:cNvSpPr txBox="1"/>
+          <p:nvPr/>
+        </p:nvSpPr>
+        <p:spPr>
+          <a:xfrm>
+            <a:off x="321075" y="1180600"/>
+            <a:ext cx="2450400" cy="498900"/>
+          </a:xfrm>
+          <a:prstGeom prst="rect">
+            <a:avLst/>
+          </a:prstGeom>
+          <a:noFill/>
+          <a:ln>
+            <a:noFill/>
+          </a:ln>
+        </p:spPr>
+        <p:txBody>
+          <a:bodyPr anchorCtr="0" anchor="t" bIns="91425" lIns="91425" spcFirstLastPara="1" rIns="91425" wrap="square" tIns="91425">
+            <a:noAutofit/>
+          </a:bodyPr>
+          <a:lstStyle/>
+          <a:p>
+            <a:pPr indent="0" lvl="0" marL="0" rtl="0" algn="l">
+              <a:spcBef>
+                <a:spcPts val="0"/>
+              </a:spcBef>
+              <a:spcAft>
+                <a:spcPts val="0"/>
+              </a:spcAft>
+              <a:buNone/>
+            </a:pPr>
+            <a:r>
+              <a:rPr b="1" lang="en" sz="1800">
+                <a:solidFill>
+                  <a:schemeClr val="dk2"/>
+                </a:solidFill>
+                <a:latin typeface="Red Hat Display"/>
+                <a:ea typeface="Red Hat Display"/>
+                <a:cs typeface="Red Hat Display"/>
+                <a:sym typeface="Red Hat Display"/>
+              </a:rPr>
+              <a:t>Social determinants of health</a:t>
+            </a:r>
+            <a:endParaRPr b="1" sz="1800">
+              <a:solidFill>
+                <a:schemeClr val="dk2"/>
+              </a:solidFill>
+              <a:latin typeface="Red Hat Display"/>
+              <a:ea typeface="Red Hat Display"/>
+              <a:cs typeface="Red Hat Display"/>
+              <a:sym typeface="Red Hat Display"/>
+            </a:endParaRPr>
+          </a:p>
+        </p:txBody>
+      </p:sp>
+      <p:sp>
+        <p:nvSpPr>
+          <p:cNvPr id="123" name="Google Shape;123;p20"/>
+          <p:cNvSpPr txBox="1"/>
+          <p:nvPr>
+            <p:ph type="title"/>
+          </p:nvPr>
+        </p:nvSpPr>
+        <p:spPr>
+          <a:xfrm>
+            <a:off x="0" y="423000"/>
+            <a:ext cx="9144000" cy="572700"/>
+          </a:xfrm>
+          <a:prstGeom prst="rect">
+            <a:avLst/>
+          </a:prstGeom>
+        </p:spPr>
+        <p:txBody>
+          <a:bodyPr anchorCtr="0" anchor="t" bIns="91425" lIns="91425" spcFirstLastPara="1" rIns="91425" wrap="square" tIns="91425">
+            <a:normAutofit fontScale="90000"/>
+          </a:bodyPr>
+          <a:lstStyle/>
+          <a:p>
+            <a:pPr indent="0" lvl="0" marL="0" rtl="0" algn="ctr">
+              <a:spcBef>
+                <a:spcPts val="0"/>
+              </a:spcBef>
+              <a:spcAft>
+                <a:spcPts val="0"/>
+              </a:spcAft>
+              <a:buNone/>
+            </a:pPr>
+            <a:r>
+              <a:rPr lang="en">
+                <a:latin typeface="Fjalla One"/>
+                <a:ea typeface="Fjalla One"/>
+                <a:cs typeface="Fjalla One"/>
+                <a:sym typeface="Fjalla One"/>
+              </a:rPr>
+              <a:t>Covid-19 Explanatory Mechanisms at Different Scales</a:t>
+            </a:r>
+            <a:endParaRPr>
+              <a:latin typeface="Fjalla One"/>
+              <a:ea typeface="Fjalla One"/>
+              <a:cs typeface="Fjalla One"/>
+              <a:sym typeface="Fjalla One"/>
+            </a:endParaRPr>
+          </a:p>
+        </p:txBody>
+      </p:sp>
+      <p:cxnSp>
+        <p:nvCxnSpPr>
+          <p:cNvPr id="124" name="Google Shape;124;p20"/>
+          <p:cNvCxnSpPr/>
+          <p:nvPr/>
+        </p:nvCxnSpPr>
+        <p:spPr>
+          <a:xfrm>
+            <a:off x="2235875" y="3050975"/>
+            <a:ext cx="1074900" cy="0"/>
+          </a:xfrm>
+          <a:prstGeom prst="straightConnector1">
+            <a:avLst/>
+          </a:prstGeom>
+          <a:noFill/>
+          <a:ln cap="flat" cmpd="sng" w="19050">
+            <a:solidFill>
+              <a:srgbClr val="B7B7B7"/>
+            </a:solidFill>
+            <a:prstDash val="dot"/>
+            <a:round/>
+            <a:headEnd len="med" w="med" type="none"/>
+            <a:tailEnd len="med" w="med" type="none"/>
+          </a:ln>
+        </p:spPr>
+      </p:cxnSp>
+    </p:spTree>
+  </p:cSld>
+  <p:clrMapOvr>
+    <a:masterClrMapping/>
+  </p:clrMapOvr>
+</p:sld>
+</file>
+
+<file path=ppt/slides/slide9.xml><?xml version="1.0" encoding="utf-8"?>
+<p:sld xmlns:a="http://schemas.openxmlformats.org/drawingml/2006/main" xmlns:r="http://schemas.openxmlformats.org/officeDocument/2006/relationships" xmlns:mc="http://schemas.openxmlformats.org/markup-compatibility/2006" xmlns:mv="urn:schemas-microsoft-com:mac:vml" xmlns:p="http://schemas.openxmlformats.org/presentationml/2006/main" xmlns:c="http://schemas.openxmlformats.org/drawingml/2006/chart" xmlns:dgm="http://schemas.openxmlformats.org/drawingml/2006/diagram" xmlns:o="urn:schemas-microsoft-com:office:office" xmlns:v="urn:schemas-microsoft-com:vml" xmlns:pvml="urn:schemas-microsoft-com:office:powerpoint" xmlns:com="http://schemas.openxmlformats.org/drawingml/2006/compatibility" xmlns:p14="http://schemas.microsoft.com/office/powerpoint/2010/main" xmlns:p15="http://schemas.microsoft.com/office/powerpoint/2012/main" xmlns:ahyp="http://schemas.microsoft.com/office/drawing/2018/hyperlinkcolor">
+  <p:cSld>
+    <p:spTree>
+      <p:nvGrpSpPr>
+        <p:cNvPr id="128" name="Shape 128"/>
         <p:cNvGrpSpPr/>
         <p:nvPr/>
       </p:nvGrpSpPr>
@@ -7826,7 +8387,7 @@
       </p:grpSpPr>
       <p:sp>
         <p:nvSpPr>
-          <p:cNvPr id="116" name="Google Shape;116;p20"/>
+          <p:cNvPr id="129" name="Google Shape;129;p21"/>
           <p:cNvSpPr txBox="1"/>
           <p:nvPr>
             <p:ph type="title"/>
@@ -7866,7 +8427,7 @@
       </p:sp>
       <p:sp>
         <p:nvSpPr>
-          <p:cNvPr id="117" name="Google Shape;117;p20"/>
+          <p:cNvPr id="130" name="Google Shape;130;p21"/>
           <p:cNvSpPr txBox="1"/>
           <p:nvPr>
             <p:ph idx="1" type="body"/>
@@ -7986,6 +8547,285 @@
 </file>
 
 <file path=ppt/theme/theme1.xml><?xml version="1.0" encoding="utf-8"?>
+<a:theme xmlns:a="http://schemas.openxmlformats.org/drawingml/2006/main" xmlns:r="http://schemas.openxmlformats.org/officeDocument/2006/relationships" name="Simple Light">
+  <a:themeElements>
+    <a:clrScheme name="Simple Light">
+      <a:dk1>
+        <a:srgbClr val="000000"/>
+      </a:dk1>
+      <a:lt1>
+        <a:srgbClr val="FFFFFF"/>
+      </a:lt1>
+      <a:dk2>
+        <a:srgbClr val="595959"/>
+      </a:dk2>
+      <a:lt2>
+        <a:srgbClr val="EEEEEE"/>
+      </a:lt2>
+      <a:accent1>
+        <a:srgbClr val="4285F4"/>
+      </a:accent1>
+      <a:accent2>
+        <a:srgbClr val="212121"/>
+      </a:accent2>
+      <a:accent3>
+        <a:srgbClr val="78909C"/>
+      </a:accent3>
+      <a:accent4>
+        <a:srgbClr val="FFAB40"/>
+      </a:accent4>
+      <a:accent5>
+        <a:srgbClr val="0097A7"/>
+      </a:accent5>
+      <a:accent6>
+        <a:srgbClr val="EEFF41"/>
+      </a:accent6>
+      <a:hlink>
+        <a:srgbClr val="0097A7"/>
+      </a:hlink>
+      <a:folHlink>
+        <a:srgbClr val="0097A7"/>
+      </a:folHlink>
+    </a:clrScheme>
+    <a:fontScheme name="Office">
+      <a:majorFont>
+        <a:latin typeface="Arial"/>
+        <a:ea typeface=""/>
+        <a:cs typeface=""/>
+        <a:font script="Jpan" typeface="ＭＳ Ｐゴシック"/>
+        <a:font script="Hang" typeface="맑은 고딕"/>
+        <a:font script="Hans" typeface="宋体"/>
+        <a:font script="Hant" typeface="新細明體"/>
+        <a:font script="Arab" typeface="Times New Roman"/>
+        <a:font script="Hebr" typeface="Times New Roman"/>
+        <a:font script="Thai" typeface="Angsana New"/>
+        <a:font script="Ethi" typeface="Nyala"/>
+        <a:font script="Beng" typeface="Vrinda"/>
+        <a:font script="Gujr" typeface="Shruti"/>
+        <a:font script="Khmr" typeface="MoolBoran"/>
+        <a:font script="Knda" typeface="Tunga"/>
+        <a:font script="Guru" typeface="Raavi"/>
+        <a:font script="Cans" typeface="Euphemia"/>
+        <a:font script="Cher" typeface="Plantagenet Cherokee"/>
+        <a:font script="Yiii" typeface="Microsoft Yi Baiti"/>
+        <a:font script="Tibt" typeface="Microsoft Himalaya"/>
+        <a:font script="Thaa" typeface="MV Boli"/>
+        <a:font script="Deva" typeface="Mangal"/>
+        <a:font script="Telu" typeface="Gautami"/>
+        <a:font script="Taml" typeface="Latha"/>
+        <a:font script="Syrc" typeface="Estrangelo Edessa"/>
+        <a:font script="Orya" typeface="Kalinga"/>
+        <a:font script="Mlym" typeface="Kartika"/>
+        <a:font script="Laoo" typeface="DokChampa"/>
+        <a:font script="Sinh" typeface="Iskoola Pota"/>
+        <a:font script="Mong" typeface="Mongolian Baiti"/>
+        <a:font script="Viet" typeface="Times New Roman"/>
+        <a:font script="Uigh" typeface="Microsoft Uighur"/>
+        <a:font script="Geor" typeface="Sylfaen"/>
+      </a:majorFont>
+      <a:minorFont>
+        <a:latin typeface="Arial"/>
+        <a:ea typeface=""/>
+        <a:cs typeface=""/>
+        <a:font script="Jpan" typeface="ＭＳ Ｐゴシック"/>
+        <a:font script="Hang" typeface="맑은 고딕"/>
+        <a:font script="Hans" typeface="宋体"/>
+        <a:font script="Hant" typeface="新細明體"/>
+        <a:font script="Arab" typeface="Arial"/>
+        <a:font script="Hebr" typeface="Arial"/>
+        <a:font script="Thai" typeface="Cordia New"/>
+        <a:font script="Ethi" typeface="Nyala"/>
+        <a:font script="Beng" typeface="Vrinda"/>
+        <a:font script="Gujr" typeface="Shruti"/>
+        <a:font script="Khmr" typeface="DaunPenh"/>
+        <a:font script="Knda" typeface="Tunga"/>
+        <a:font script="Guru" typeface="Raavi"/>
+        <a:font script="Cans" typeface="Euphemia"/>
+        <a:font script="Cher" typeface="Plantagenet Cherokee"/>
+        <a:font script="Yiii" typeface="Microsoft Yi Baiti"/>
+        <a:font script="Tibt" typeface="Microsoft Himalaya"/>
+        <a:font script="Thaa" typeface="MV Boli"/>
+        <a:font script="Deva" typeface="Mangal"/>
+        <a:font script="Telu" typeface="Gautami"/>
+        <a:font script="Taml" typeface="Latha"/>
+        <a:font script="Syrc" typeface="Estrangelo Edessa"/>
+        <a:font script="Orya" typeface="Kalinga"/>
+        <a:font script="Mlym" typeface="Kartika"/>
+        <a:font script="Laoo" typeface="DokChampa"/>
+        <a:font script="Sinh" typeface="Iskoola Pota"/>
+        <a:font script="Mong" typeface="Mongolian Baiti"/>
+        <a:font script="Viet" typeface="Arial"/>
+        <a:font script="Uigh" typeface="Microsoft Uighur"/>
+        <a:font script="Geor" typeface="Sylfaen"/>
+      </a:minorFont>
+    </a:fontScheme>
+    <a:fmtScheme name="Office">
+      <a:fillStyleLst>
+        <a:solidFill>
+          <a:schemeClr val="phClr"/>
+        </a:solidFill>
+        <a:gradFill rotWithShape="1">
+          <a:gsLst>
+            <a:gs pos="0">
+              <a:schemeClr val="phClr">
+                <a:tint val="50000"/>
+                <a:satMod val="300000"/>
+              </a:schemeClr>
+            </a:gs>
+            <a:gs pos="35000">
+              <a:schemeClr val="phClr">
+                <a:tint val="37000"/>
+                <a:satMod val="300000"/>
+              </a:schemeClr>
+            </a:gs>
+            <a:gs pos="100000">
+              <a:schemeClr val="phClr">
+                <a:tint val="15000"/>
+                <a:satMod val="350000"/>
+              </a:schemeClr>
+            </a:gs>
+          </a:gsLst>
+          <a:lin ang="16200000" scaled="1"/>
+        </a:gradFill>
+        <a:gradFill rotWithShape="1">
+          <a:gsLst>
+            <a:gs pos="0">
+              <a:schemeClr val="phClr">
+                <a:tint val="100000"/>
+                <a:shade val="100000"/>
+                <a:satMod val="130000"/>
+              </a:schemeClr>
+            </a:gs>
+            <a:gs pos="100000">
+              <a:schemeClr val="phClr">
+                <a:tint val="50000"/>
+                <a:shade val="100000"/>
+                <a:satMod val="350000"/>
+              </a:schemeClr>
+            </a:gs>
+          </a:gsLst>
+          <a:lin ang="16200000" scaled="0"/>
+        </a:gradFill>
+      </a:fillStyleLst>
+      <a:lnStyleLst>
+        <a:ln w="9525" cap="flat" cmpd="sng" algn="ctr">
+          <a:solidFill>
+            <a:schemeClr val="phClr">
+              <a:shade val="95000"/>
+              <a:satMod val="105000"/>
+            </a:schemeClr>
+          </a:solidFill>
+          <a:prstDash val="solid"/>
+        </a:ln>
+        <a:ln w="25400" cap="flat" cmpd="sng" algn="ctr">
+          <a:solidFill>
+            <a:schemeClr val="phClr"/>
+          </a:solidFill>
+          <a:prstDash val="solid"/>
+        </a:ln>
+        <a:ln w="38100" cap="flat" cmpd="sng" algn="ctr">
+          <a:solidFill>
+            <a:schemeClr val="phClr"/>
+          </a:solidFill>
+          <a:prstDash val="solid"/>
+        </a:ln>
+      </a:lnStyleLst>
+      <a:effectStyleLst>
+        <a:effectStyle>
+          <a:effectLst>
+            <a:outerShdw blurRad="40000" dist="20000" dir="5400000" rotWithShape="0">
+              <a:srgbClr val="000000">
+                <a:alpha val="38000"/>
+              </a:srgbClr>
+            </a:outerShdw>
+          </a:effectLst>
+        </a:effectStyle>
+        <a:effectStyle>
+          <a:effectLst>
+            <a:outerShdw blurRad="40000" dist="23000" dir="5400000" rotWithShape="0">
+              <a:srgbClr val="000000">
+                <a:alpha val="35000"/>
+              </a:srgbClr>
+            </a:outerShdw>
+          </a:effectLst>
+        </a:effectStyle>
+        <a:effectStyle>
+          <a:effectLst>
+            <a:outerShdw blurRad="40000" dist="23000" dir="5400000" rotWithShape="0">
+              <a:srgbClr val="000000">
+                <a:alpha val="35000"/>
+              </a:srgbClr>
+            </a:outerShdw>
+          </a:effectLst>
+          <a:scene3d>
+            <a:camera prst="orthographicFront">
+              <a:rot lat="0" lon="0" rev="0"/>
+            </a:camera>
+            <a:lightRig rig="threePt" dir="t">
+              <a:rot lat="0" lon="0" rev="1200000"/>
+            </a:lightRig>
+          </a:scene3d>
+          <a:sp3d>
+            <a:bevelT w="63500" h="25400"/>
+          </a:sp3d>
+        </a:effectStyle>
+      </a:effectStyleLst>
+      <a:bgFillStyleLst>
+        <a:solidFill>
+          <a:schemeClr val="phClr"/>
+        </a:solidFill>
+        <a:gradFill rotWithShape="1">
+          <a:gsLst>
+            <a:gs pos="0">
+              <a:schemeClr val="phClr">
+                <a:tint val="40000"/>
+                <a:satMod val="350000"/>
+              </a:schemeClr>
+            </a:gs>
+            <a:gs pos="40000">
+              <a:schemeClr val="phClr">
+                <a:tint val="45000"/>
+                <a:shade val="99000"/>
+                <a:satMod val="350000"/>
+              </a:schemeClr>
+            </a:gs>
+            <a:gs pos="100000">
+              <a:schemeClr val="phClr">
+                <a:shade val="20000"/>
+                <a:satMod val="255000"/>
+              </a:schemeClr>
+            </a:gs>
+          </a:gsLst>
+          <a:path path="circle">
+            <a:fillToRect l="50000" t="-80000" r="50000" b="180000"/>
+          </a:path>
+        </a:gradFill>
+        <a:gradFill rotWithShape="1">
+          <a:gsLst>
+            <a:gs pos="0">
+              <a:schemeClr val="phClr">
+                <a:tint val="80000"/>
+                <a:satMod val="300000"/>
+              </a:schemeClr>
+            </a:gs>
+            <a:gs pos="100000">
+              <a:schemeClr val="phClr">
+                <a:shade val="30000"/>
+                <a:satMod val="200000"/>
+              </a:schemeClr>
+            </a:gs>
+          </a:gsLst>
+          <a:path path="circle">
+            <a:fillToRect l="50000" t="50000" r="50000" b="50000"/>
+          </a:path>
+        </a:gradFill>
+      </a:bgFillStyleLst>
+    </a:fmtScheme>
+  </a:themeElements>
+</a:theme>
+</file>
+
+<file path=ppt/theme/theme2.xml><?xml version="1.0" encoding="utf-8"?>
 <a:theme xmlns:a="http://schemas.openxmlformats.org/drawingml/2006/main" xmlns:r="http://schemas.openxmlformats.org/officeDocument/2006/relationships">
   <a:themeElements>
     <a:clrScheme name="Default">
@@ -8262,283 +9102,4 @@
     </a:fmtScheme>
   </a:themeElements>
 </a:theme>
-</file>
-
-<file path=ppt/theme/theme2.xml><?xml version="1.0" encoding="utf-8"?>
-<a:theme xmlns:a="http://schemas.openxmlformats.org/drawingml/2006/main" xmlns:r="http://schemas.openxmlformats.org/officeDocument/2006/relationships" name="Simple Light">
-  <a:themeElements>
-    <a:clrScheme name="Simple Light">
-      <a:dk1>
-        <a:srgbClr val="000000"/>
-      </a:dk1>
-      <a:lt1>
-        <a:srgbClr val="FFFFFF"/>
-      </a:lt1>
-      <a:dk2>
-        <a:srgbClr val="595959"/>
-      </a:dk2>
-      <a:lt2>
-        <a:srgbClr val="EEEEEE"/>
-      </a:lt2>
-      <a:accent1>
-        <a:srgbClr val="4285F4"/>
-      </a:accent1>
-      <a:accent2>
-        <a:srgbClr val="212121"/>
-      </a:accent2>
-      <a:accent3>
-        <a:srgbClr val="78909C"/>
-      </a:accent3>
-      <a:accent4>
-        <a:srgbClr val="FFAB40"/>
-      </a:accent4>
-      <a:accent5>
-        <a:srgbClr val="0097A7"/>
-      </a:accent5>
-      <a:accent6>
-        <a:srgbClr val="EEFF41"/>
-      </a:accent6>
-      <a:hlink>
-        <a:srgbClr val="0097A7"/>
-      </a:hlink>
-      <a:folHlink>
-        <a:srgbClr val="0097A7"/>
-      </a:folHlink>
-    </a:clrScheme>
-    <a:fontScheme name="Office">
-      <a:majorFont>
-        <a:latin typeface="Arial"/>
-        <a:ea typeface=""/>
-        <a:cs typeface=""/>
-        <a:font script="Jpan" typeface="ＭＳ Ｐゴシック"/>
-        <a:font script="Hang" typeface="맑은 고딕"/>
-        <a:font script="Hans" typeface="宋体"/>
-        <a:font script="Hant" typeface="新細明體"/>
-        <a:font script="Arab" typeface="Times New Roman"/>
-        <a:font script="Hebr" typeface="Times New Roman"/>
-        <a:font script="Thai" typeface="Angsana New"/>
-        <a:font script="Ethi" typeface="Nyala"/>
-        <a:font script="Beng" typeface="Vrinda"/>
-        <a:font script="Gujr" typeface="Shruti"/>
-        <a:font script="Khmr" typeface="MoolBoran"/>
-        <a:font script="Knda" typeface="Tunga"/>
-        <a:font script="Guru" typeface="Raavi"/>
-        <a:font script="Cans" typeface="Euphemia"/>
-        <a:font script="Cher" typeface="Plantagenet Cherokee"/>
-        <a:font script="Yiii" typeface="Microsoft Yi Baiti"/>
-        <a:font script="Tibt" typeface="Microsoft Himalaya"/>
-        <a:font script="Thaa" typeface="MV Boli"/>
-        <a:font script="Deva" typeface="Mangal"/>
-        <a:font script="Telu" typeface="Gautami"/>
-        <a:font script="Taml" typeface="Latha"/>
-        <a:font script="Syrc" typeface="Estrangelo Edessa"/>
-        <a:font script="Orya" typeface="Kalinga"/>
-        <a:font script="Mlym" typeface="Kartika"/>
-        <a:font script="Laoo" typeface="DokChampa"/>
-        <a:font script="Sinh" typeface="Iskoola Pota"/>
-        <a:font script="Mong" typeface="Mongolian Baiti"/>
-        <a:font script="Viet" typeface="Times New Roman"/>
-        <a:font script="Uigh" typeface="Microsoft Uighur"/>
-        <a:font script="Geor" typeface="Sylfaen"/>
-      </a:majorFont>
-      <a:minorFont>
-        <a:latin typeface="Arial"/>
-        <a:ea typeface=""/>
-        <a:cs typeface=""/>
-        <a:font script="Jpan" typeface="ＭＳ Ｐゴシック"/>
-        <a:font script="Hang" typeface="맑은 고딕"/>
-        <a:font script="Hans" typeface="宋体"/>
-        <a:font script="Hant" typeface="新細明體"/>
-        <a:font script="Arab" typeface="Arial"/>
-        <a:font script="Hebr" typeface="Arial"/>
-        <a:font script="Thai" typeface="Cordia New"/>
-        <a:font script="Ethi" typeface="Nyala"/>
-        <a:font script="Beng" typeface="Vrinda"/>
-        <a:font script="Gujr" typeface="Shruti"/>
-        <a:font script="Khmr" typeface="DaunPenh"/>
-        <a:font script="Knda" typeface="Tunga"/>
-        <a:font script="Guru" typeface="Raavi"/>
-        <a:font script="Cans" typeface="Euphemia"/>
-        <a:font script="Cher" typeface="Plantagenet Cherokee"/>
-        <a:font script="Yiii" typeface="Microsoft Yi Baiti"/>
-        <a:font script="Tibt" typeface="Microsoft Himalaya"/>
-        <a:font script="Thaa" typeface="MV Boli"/>
-        <a:font script="Deva" typeface="Mangal"/>
-        <a:font script="Telu" typeface="Gautami"/>
-        <a:font script="Taml" typeface="Latha"/>
-        <a:font script="Syrc" typeface="Estrangelo Edessa"/>
-        <a:font script="Orya" typeface="Kalinga"/>
-        <a:font script="Mlym" typeface="Kartika"/>
-        <a:font script="Laoo" typeface="DokChampa"/>
-        <a:font script="Sinh" typeface="Iskoola Pota"/>
-        <a:font script="Mong" typeface="Mongolian Baiti"/>
-        <a:font script="Viet" typeface="Arial"/>
-        <a:font script="Uigh" typeface="Microsoft Uighur"/>
-        <a:font script="Geor" typeface="Sylfaen"/>
-      </a:minorFont>
-    </a:fontScheme>
-    <a:fmtScheme name="Office">
-      <a:fillStyleLst>
-        <a:solidFill>
-          <a:schemeClr val="phClr"/>
-        </a:solidFill>
-        <a:gradFill rotWithShape="1">
-          <a:gsLst>
-            <a:gs pos="0">
-              <a:schemeClr val="phClr">
-                <a:tint val="50000"/>
-                <a:satMod val="300000"/>
-              </a:schemeClr>
-            </a:gs>
-            <a:gs pos="35000">
-              <a:schemeClr val="phClr">
-                <a:tint val="37000"/>
-                <a:satMod val="300000"/>
-              </a:schemeClr>
-            </a:gs>
-            <a:gs pos="100000">
-              <a:schemeClr val="phClr">
-                <a:tint val="15000"/>
-                <a:satMod val="350000"/>
-              </a:schemeClr>
-            </a:gs>
-          </a:gsLst>
-          <a:lin ang="16200000" scaled="1"/>
-        </a:gradFill>
-        <a:gradFill rotWithShape="1">
-          <a:gsLst>
-            <a:gs pos="0">
-              <a:schemeClr val="phClr">
-                <a:tint val="100000"/>
-                <a:shade val="100000"/>
-                <a:satMod val="130000"/>
-              </a:schemeClr>
-            </a:gs>
-            <a:gs pos="100000">
-              <a:schemeClr val="phClr">
-                <a:tint val="50000"/>
-                <a:shade val="100000"/>
-                <a:satMod val="350000"/>
-              </a:schemeClr>
-            </a:gs>
-          </a:gsLst>
-          <a:lin ang="16200000" scaled="0"/>
-        </a:gradFill>
-      </a:fillStyleLst>
-      <a:lnStyleLst>
-        <a:ln w="9525" cap="flat" cmpd="sng" algn="ctr">
-          <a:solidFill>
-            <a:schemeClr val="phClr">
-              <a:shade val="95000"/>
-              <a:satMod val="105000"/>
-            </a:schemeClr>
-          </a:solidFill>
-          <a:prstDash val="solid"/>
-        </a:ln>
-        <a:ln w="25400" cap="flat" cmpd="sng" algn="ctr">
-          <a:solidFill>
-            <a:schemeClr val="phClr"/>
-          </a:solidFill>
-          <a:prstDash val="solid"/>
-        </a:ln>
-        <a:ln w="38100" cap="flat" cmpd="sng" algn="ctr">
-          <a:solidFill>
-            <a:schemeClr val="phClr"/>
-          </a:solidFill>
-          <a:prstDash val="solid"/>
-        </a:ln>
-      </a:lnStyleLst>
-      <a:effectStyleLst>
-        <a:effectStyle>
-          <a:effectLst>
-            <a:outerShdw blurRad="40000" dist="20000" dir="5400000" rotWithShape="0">
-              <a:srgbClr val="000000">
-                <a:alpha val="38000"/>
-              </a:srgbClr>
-            </a:outerShdw>
-          </a:effectLst>
-        </a:effectStyle>
-        <a:effectStyle>
-          <a:effectLst>
-            <a:outerShdw blurRad="40000" dist="23000" dir="5400000" rotWithShape="0">
-              <a:srgbClr val="000000">
-                <a:alpha val="35000"/>
-              </a:srgbClr>
-            </a:outerShdw>
-          </a:effectLst>
-        </a:effectStyle>
-        <a:effectStyle>
-          <a:effectLst>
-            <a:outerShdw blurRad="40000" dist="23000" dir="5400000" rotWithShape="0">
-              <a:srgbClr val="000000">
-                <a:alpha val="35000"/>
-              </a:srgbClr>
-            </a:outerShdw>
-          </a:effectLst>
-          <a:scene3d>
-            <a:camera prst="orthographicFront">
-              <a:rot lat="0" lon="0" rev="0"/>
-            </a:camera>
-            <a:lightRig rig="threePt" dir="t">
-              <a:rot lat="0" lon="0" rev="1200000"/>
-            </a:lightRig>
-          </a:scene3d>
-          <a:sp3d>
-            <a:bevelT w="63500" h="25400"/>
-          </a:sp3d>
-        </a:effectStyle>
-      </a:effectStyleLst>
-      <a:bgFillStyleLst>
-        <a:solidFill>
-          <a:schemeClr val="phClr"/>
-        </a:solidFill>
-        <a:gradFill rotWithShape="1">
-          <a:gsLst>
-            <a:gs pos="0">
-              <a:schemeClr val="phClr">
-                <a:tint val="40000"/>
-                <a:satMod val="350000"/>
-              </a:schemeClr>
-            </a:gs>
-            <a:gs pos="40000">
-              <a:schemeClr val="phClr">
-                <a:tint val="45000"/>
-                <a:shade val="99000"/>
-                <a:satMod val="350000"/>
-              </a:schemeClr>
-            </a:gs>
-            <a:gs pos="100000">
-              <a:schemeClr val="phClr">
-                <a:shade val="20000"/>
-                <a:satMod val="255000"/>
-              </a:schemeClr>
-            </a:gs>
-          </a:gsLst>
-          <a:path path="circle">
-            <a:fillToRect l="50000" t="-80000" r="50000" b="180000"/>
-          </a:path>
-        </a:gradFill>
-        <a:gradFill rotWithShape="1">
-          <a:gsLst>
-            <a:gs pos="0">
-              <a:schemeClr val="phClr">
-                <a:tint val="80000"/>
-                <a:satMod val="300000"/>
-              </a:schemeClr>
-            </a:gs>
-            <a:gs pos="100000">
-              <a:schemeClr val="phClr">
-                <a:shade val="30000"/>
-                <a:satMod val="200000"/>
-              </a:schemeClr>
-            </a:gs>
-          </a:gsLst>
-          <a:path path="circle">
-            <a:fillToRect l="50000" t="50000" r="50000" b="50000"/>
-          </a:path>
-        </a:gradFill>
-      </a:bgFillStyleLst>
-    </a:fmtScheme>
-  </a:themeElements>
-</a:theme>
 </file>
</xml_diff>